<commit_message>
Updating PPT to make it nicer
</commit_message>
<xml_diff>
--- a/Documentation/UCF Contact Manager-Final.pptx
+++ b/Documentation/UCF Contact Manager-Final.pptx
@@ -10595,31 +10595,6 @@
             </a:r>
           </a:p>
           <a:p>
-            <a:pPr marL="742950" lvl="1" indent="-228600" defTabSz="914400">
-              <a:lnSpc>
-                <a:spcPct val="100000"/>
-              </a:lnSpc>
-              <a:spcBef>
-                <a:spcPts val="0"/>
-              </a:spcBef>
-              <a:spcAft>
-                <a:spcPts val="800"/>
-              </a:spcAft>
-              <a:defRPr/>
-            </a:pPr>
-            <a:r>
-              <a:rPr lang="en-US" sz="2800" dirty="0">
-                <a:solidFill>
-                  <a:srgbClr val="FFFFFF"/>
-                </a:solidFill>
-                <a:latin typeface="+mn-lt"/>
-                <a:ea typeface="+mn-ea"/>
-                <a:cs typeface="+mn-cs"/>
-              </a:rPr>
-              <a:t>Confluence - Documentation</a:t>
-            </a:r>
-          </a:p>
-          <a:p>
             <a:pPr lvl="2" indent="0" defTabSz="914400">
               <a:spcBef>
                 <a:spcPts val="0"/>
@@ -10754,7 +10729,7 @@
         </p:blipFill>
         <p:spPr>
           <a:xfrm>
-            <a:off x="688200" y="1428049"/>
+            <a:off x="688199" y="1696677"/>
             <a:ext cx="1294646" cy="369434"/>
           </a:xfrm>
           <a:prstGeom prst="rect">
@@ -10783,7 +10758,7 @@
         </p:blipFill>
         <p:spPr>
           <a:xfrm>
-            <a:off x="963614" y="2083336"/>
+            <a:off x="963613" y="2310407"/>
             <a:ext cx="743819" cy="696166"/>
           </a:xfrm>
           <a:prstGeom prst="rect">
@@ -10812,37 +10787,8 @@
         </p:blipFill>
         <p:spPr>
           <a:xfrm>
-            <a:off x="882931" y="3065355"/>
+            <a:off x="903609" y="3250869"/>
             <a:ext cx="905184" cy="598136"/>
-          </a:xfrm>
-          <a:prstGeom prst="rect">
-            <a:avLst/>
-          </a:prstGeom>
-        </p:spPr>
-      </p:pic>
-      <p:pic>
-        <p:nvPicPr>
-          <p:cNvPr id="6" name="Picture 5"/>
-          <p:cNvPicPr>
-            <a:picLocks noChangeAspect="1"/>
-          </p:cNvPicPr>
-          <p:nvPr/>
-        </p:nvPicPr>
-        <p:blipFill rotWithShape="1">
-          <a:blip r:embed="rId6">
-            <a:extLst>
-              <a:ext uri="{28A0092B-C50C-407E-A947-70E740481C1C}">
-                <a14:useLocalDpi xmlns:a14="http://schemas.microsoft.com/office/drawing/2010/main" val="0"/>
-              </a:ext>
-            </a:extLst>
-          </a:blip>
-          <a:srcRect t="29933" b="29495"/>
-          <a:stretch/>
-        </p:blipFill>
-        <p:spPr>
-          <a:xfrm>
-            <a:off x="633695" y="3949343"/>
-            <a:ext cx="1403657" cy="315962"/>
           </a:xfrm>
           <a:prstGeom prst="rect">
             <a:avLst/>

</xml_diff>